<commit_message>
Presentation update for 2024-fall-oakridge
</commit_message>
<xml_diff>
--- a/presentations/EPICS 7 Overview.pptx
+++ b/presentations/EPICS 7 Overview.pptx
@@ -252,7 +252,7 @@
           <a:p>
             <a:fld id="{E00E58FE-3AE1-4995-80E6-8AF0F1DA0E4E}" type="datetimeFigureOut">
               <a:rPr lang="de-DE" smtClean="0"/>
-              <a:t>14.04.2024</a:t>
+              <a:t>16.09.2024</a:t>
             </a:fld>
             <a:endParaRPr lang="de-DE"/>
           </a:p>
@@ -429,7 +429,7 @@
           <a:p>
             <a:fld id="{45091381-FB9B-4B1C-99E3-890DFD4525D3}" type="datetimeFigureOut">
               <a:rPr lang="de-DE" smtClean="0"/>
-              <a:t>14.04.2024</a:t>
+              <a:t>16.09.2024</a:t>
             </a:fld>
             <a:endParaRPr lang="de-DE"/>
           </a:p>
@@ -1309,7 +1309,7 @@
           <a:p>
             <a:fld id="{77B9AAF2-2243-4209-A85C-F7036AF186DC}" type="datetimeFigureOut">
               <a:rPr lang="de-DE" smtClean="0"/>
-              <a:t>14.04.2024</a:t>
+              <a:t>16.09.2024</a:t>
             </a:fld>
             <a:endParaRPr lang="de-DE"/>
           </a:p>
@@ -1547,7 +1547,7 @@
           <a:p>
             <a:fld id="{77B9AAF2-2243-4209-A85C-F7036AF186DC}" type="datetimeFigureOut">
               <a:rPr lang="de-DE" smtClean="0"/>
-              <a:t>14.04.2024</a:t>
+              <a:t>16.09.2024</a:t>
             </a:fld>
             <a:endParaRPr lang="de-DE"/>
           </a:p>
@@ -1785,7 +1785,7 @@
           <a:p>
             <a:fld id="{77B9AAF2-2243-4209-A85C-F7036AF186DC}" type="datetimeFigureOut">
               <a:rPr lang="de-DE" smtClean="0"/>
-              <a:t>14.04.2024</a:t>
+              <a:t>16.09.2024</a:t>
             </a:fld>
             <a:endParaRPr lang="de-DE"/>
           </a:p>
@@ -2023,7 +2023,7 @@
           <a:p>
             <a:fld id="{77B9AAF2-2243-4209-A85C-F7036AF186DC}" type="datetimeFigureOut">
               <a:rPr lang="de-DE" smtClean="0"/>
-              <a:t>14.04.2024</a:t>
+              <a:t>16.09.2024</a:t>
             </a:fld>
             <a:endParaRPr lang="de-DE"/>
           </a:p>
@@ -2328,7 +2328,7 @@
           <a:p>
             <a:fld id="{77B9AAF2-2243-4209-A85C-F7036AF186DC}" type="datetimeFigureOut">
               <a:rPr lang="de-DE" smtClean="0"/>
-              <a:t>14.04.2024</a:t>
+              <a:t>16.09.2024</a:t>
             </a:fld>
             <a:endParaRPr lang="de-DE"/>
           </a:p>
@@ -2631,7 +2631,7 @@
           <a:p>
             <a:fld id="{77B9AAF2-2243-4209-A85C-F7036AF186DC}" type="datetimeFigureOut">
               <a:rPr lang="de-DE" smtClean="0"/>
-              <a:t>14.04.2024</a:t>
+              <a:t>16.09.2024</a:t>
             </a:fld>
             <a:endParaRPr lang="de-DE"/>
           </a:p>
@@ -3082,7 +3082,7 @@
           <a:p>
             <a:fld id="{77B9AAF2-2243-4209-A85C-F7036AF186DC}" type="datetimeFigureOut">
               <a:rPr lang="de-DE" smtClean="0"/>
-              <a:t>14.04.2024</a:t>
+              <a:t>16.09.2024</a:t>
             </a:fld>
             <a:endParaRPr lang="de-DE"/>
           </a:p>
@@ -3255,7 +3255,7 @@
           <a:p>
             <a:fld id="{77B9AAF2-2243-4209-A85C-F7036AF186DC}" type="datetimeFigureOut">
               <a:rPr lang="de-DE" smtClean="0"/>
-              <a:t>14.04.2024</a:t>
+              <a:t>16.09.2024</a:t>
             </a:fld>
             <a:endParaRPr lang="de-DE"/>
           </a:p>
@@ -3629,7 +3629,7 @@
           <a:p>
             <a:fld id="{77B9AAF2-2243-4209-A85C-F7036AF186DC}" type="datetimeFigureOut">
               <a:rPr lang="de-DE" smtClean="0"/>
-              <a:t>14.04.2024</a:t>
+              <a:t>16.09.2024</a:t>
             </a:fld>
             <a:endParaRPr lang="de-DE"/>
           </a:p>
@@ -3950,7 +3950,7 @@
           <a:p>
             <a:fld id="{77B9AAF2-2243-4209-A85C-F7036AF186DC}" type="datetimeFigureOut">
               <a:rPr lang="de-DE" smtClean="0"/>
-              <a:t>14.04.2024</a:t>
+              <a:t>16.09.2024</a:t>
             </a:fld>
             <a:endParaRPr lang="de-DE"/>
           </a:p>
@@ -5404,7 +5404,7 @@
         <p:spPr>
           <a:xfrm>
             <a:off x="1314628" y="456623"/>
-            <a:ext cx="9283883" cy="3865674"/>
+            <a:ext cx="9283883" cy="4732578"/>
           </a:xfrm>
           <a:prstGeom prst="rect">
             <a:avLst/>
@@ -5559,7 +5559,7 @@
                 <a:ea typeface="Milo-Medium"/>
                 <a:cs typeface="Source Sans Pro"/>
               </a:rPr>
-              <a:t>At SLAC, a multi-year project has started that will add industrial-level security TLS-style security to the pvAccess protocol</a:t>
+              <a:t>At SLAC, a multi-year project is underway that will add industrial-level security TLS-style security to the pvAccess protocol</a:t>
             </a:r>
           </a:p>
           <a:p>
@@ -5585,7 +5585,33 @@
                 <a:ea typeface="Milo-Medium"/>
                 <a:cs typeface="Source Sans Pro"/>
               </a:rPr>
-              <a:t>The hard part, i.e. key management, is still in early design phase</a:t>
+              <a:t>Secure communication, using prototypes of client and server, is working</a:t>
+            </a:r>
+          </a:p>
+          <a:p>
+            <a:pPr marL="342900" indent="-342900" eaLnBrk="0" hangingPunct="0">
+              <a:spcBef>
+                <a:spcPts val="1000"/>
+              </a:spcBef>
+              <a:buClr>
+                <a:srgbClr val="C7DE37"/>
+              </a:buClr>
+              <a:buFont typeface="Arial" panose="020B0604020202020204" pitchFamily="34" charset="0"/>
+              <a:buChar char="•"/>
+              <a:tabLst>
+                <a:tab pos="392682" algn="l"/>
+              </a:tabLst>
+            </a:pPr>
+            <a:r>
+              <a:rPr lang="en-GB" sz="2400" dirty="0">
+                <a:solidFill>
+                  <a:srgbClr val="60737F"/>
+                </a:solidFill>
+                <a:latin typeface="Source Sans Pro"/>
+                <a:ea typeface="Milo-Medium"/>
+                <a:cs typeface="Source Sans Pro"/>
+              </a:rPr>
+              <a:t>The hard part, i.e. key management, is in its design phase</a:t>
             </a:r>
           </a:p>
         </p:txBody>
@@ -5699,6 +5725,37 @@
                                           <p:spTgt spid="2">
                                             <p:txEl>
                                               <p:pRg st="5" end="5"/>
+                                            </p:txEl>
+                                          </p:spTgt>
+                                        </p:tgtEl>
+                                        <p:attrNameLst>
+                                          <p:attrName>style.visibility</p:attrName>
+                                        </p:attrNameLst>
+                                      </p:cBhvr>
+                                      <p:to>
+                                        <p:strVal val="visible"/>
+                                      </p:to>
+                                    </p:set>
+                                  </p:childTnLst>
+                                </p:cTn>
+                              </p:par>
+                              <p:par>
+                                <p:cTn id="11" presetID="1" presetClass="entr" presetSubtype="0" fill="hold" nodeType="withEffect">
+                                  <p:stCondLst>
+                                    <p:cond delay="0"/>
+                                  </p:stCondLst>
+                                  <p:childTnLst>
+                                    <p:set>
+                                      <p:cBhvr>
+                                        <p:cTn id="12" dur="1" fill="hold">
+                                          <p:stCondLst>
+                                            <p:cond delay="0"/>
+                                          </p:stCondLst>
+                                        </p:cTn>
+                                        <p:tgtEl>
+                                          <p:spTgt spid="2">
+                                            <p:txEl>
+                                              <p:pRg st="6" end="6"/>
                                             </p:txEl>
                                           </p:spTgt>
                                         </p:tgtEl>

</xml_diff>